<commit_message>
Started work on libname program
</commit_message>
<xml_diff>
--- a/src/m01-basic-program.pptx
+++ b/src/m01-basic-program.pptx
@@ -5,7 +5,7 @@
     <p:sldMasterId id="2147483648" r:id="rId1"/>
   </p:sldMasterIdLst>
   <p:notesMasterIdLst>
-    <p:NotesMasterId r:id="rId7"/>
+    <p:NotesMasterId r:id="rId8"/>
   </p:notesMasterIdLst>
   <p:sldIdLst>
     <p:sldId id="256" r:id="rId2"/>
@@ -13,6 +13,7 @@
     <p:sldId id="258" r:id="rId4"/>
     <p:sldId id="259" r:id="rId5"/>
     <p:sldId id="260" r:id="rId6"/>
+    <p:sldId id="261" r:id="rId7"/>
   </p:sldIdLst>
   <p:sldSz cx="9144000" cy="6858000" type="screen4x3"/>
   <p:notesSz cx="6858000" cy="9144000"/>
@@ -1038,6 +1039,188 @@
             <a:fld id="{18BDFEC3-8487-43E8-A154-7C12CBC1FFF2}" type="slidenum">
               <a:rPr lang="en-US"/>
               <a:t>2</a:t>
+            </a:fld>
+            <a:endParaRPr lang="en-US"/>
+          </a:p>
+        </p:txBody>
+      </p:sp>
+    </p:spTree>
+  </p:cSld>
+</p:notes>
+</file>
+
+<file path=ppt/notesSlides/notesSlide2.xml><?xml version="1.0" encoding="utf-8"?>
+<p:notes xmlns:a="http://schemas.openxmlformats.org/drawingml/2006/main" xmlns:r="http://schemas.openxmlformats.org/officeDocument/2006/relationships" xmlns:p="http://schemas.openxmlformats.org/presentationml/2006/main">
+  <p:cSld>
+    <p:spTree>
+      <p:nvGrpSpPr>
+        <p:cNvPr id="1" name=""/>
+        <p:cNvGrpSpPr/>
+        <p:nvPr/>
+      </p:nvGrpSpPr>
+      <p:grpSpPr>
+        <a:xfrm>
+          <a:off x="0" y="0"/>
+          <a:ext cx="0" cy="0"/>
+          <a:chOff x="0" y="0"/>
+          <a:chExt cx="0" cy="0"/>
+        </a:xfrm>
+      </p:grpSpPr>
+      <p:sp>
+        <p:nvSpPr>
+          <p:cNvPr id="2" name="Slide Image Placeholder 1"/>
+          <p:cNvSpPr>
+            <a:spLocks noGrp="1" noRot="1" noChangeAspect="1"/>
+          </p:cNvSpPr>
+          <p:nvPr>
+            <p:ph type="sldImg"/>
+          </p:nvPr>
+        </p:nvSpPr>
+        <p:spPr/>
+      </p:sp>
+      <p:sp>
+        <p:nvSpPr>
+          <p:cNvPr id="3" name="Notes Placeholder 2"/>
+          <p:cNvSpPr>
+            <a:spLocks noGrp="1"/>
+          </p:cNvSpPr>
+          <p:nvPr>
+            <p:ph type="body" idx="1"/>
+          </p:nvPr>
+        </p:nvSpPr>
+        <p:spPr/>
+        <p:txBody>
+          <a:bodyPr/>
+          <a:lstStyle/>
+          <a:p>
+            <a:pPr lvl="0" marL="0" indent="0">
+              <a:buNone/>
+            </a:pPr>
+            <a:r>
+              <a:rPr/>
+              <a:t>The</a:t>
+            </a:r>
+            <a:r>
+              <a:rPr/>
+              <a:t> </a:t>
+            </a:r>
+            <a:r>
+              <a:rPr/>
+              <a:t>data</a:t>
+            </a:r>
+            <a:r>
+              <a:rPr/>
+              <a:t> </a:t>
+            </a:r>
+            <a:r>
+              <a:rPr/>
+              <a:t>statement</a:t>
+            </a:r>
+            <a:r>
+              <a:rPr/>
+              <a:t> </a:t>
+            </a:r>
+            <a:r>
+              <a:rPr/>
+              <a:t>creates</a:t>
+            </a:r>
+            <a:r>
+              <a:rPr/>
+              <a:t> </a:t>
+            </a:r>
+            <a:r>
+              <a:rPr/>
+              <a:t>a</a:t>
+            </a:r>
+            <a:r>
+              <a:rPr/>
+              <a:t> </a:t>
+            </a:r>
+            <a:r>
+              <a:rPr/>
+              <a:t>dataset</a:t>
+            </a:r>
+            <a:r>
+              <a:rPr/>
+              <a:t> </a:t>
+            </a:r>
+            <a:r>
+              <a:rPr/>
+              <a:t>with</a:t>
+            </a:r>
+            <a:r>
+              <a:rPr/>
+              <a:t> </a:t>
+            </a:r>
+            <a:r>
+              <a:rPr/>
+              <a:t>the</a:t>
+            </a:r>
+            <a:r>
+              <a:rPr/>
+              <a:t> </a:t>
+            </a:r>
+            <a:r>
+              <a:rPr/>
+              <a:t>name</a:t>
+            </a:r>
+            <a:r>
+              <a:rPr/>
+              <a:t> </a:t>
+            </a:r>
+            <a:r>
+              <a:rPr/>
+              <a:t>“</a:t>
+            </a:r>
+            <a:r>
+              <a:rPr/>
+              <a:t>small_example</a:t>
+            </a:r>
+            <a:r>
+              <a:rPr/>
+              <a:t>”</a:t>
+            </a:r>
+            <a:r>
+              <a:rPr/>
+              <a:t>.</a:t>
+            </a:r>
+            <a:r>
+              <a:rPr/>
+              <a:t> </a:t>
+            </a:r>
+            <a:r>
+              <a:rPr/>
+              <a:t>The</a:t>
+            </a:r>
+            <a:r>
+              <a:rPr/>
+              <a:t> </a:t>
+            </a:r>
+            <a:r>
+              <a:rPr/>
+              <a:t>input</a:t>
+            </a:r>
+          </a:p>
+        </p:txBody>
+      </p:sp>
+      <p:sp>
+        <p:nvSpPr>
+          <p:cNvPr id="4" name="Slide Number Placeholder 3"/>
+          <p:cNvSpPr>
+            <a:spLocks noGrp="1"/>
+          </p:cNvSpPr>
+          <p:nvPr>
+            <p:ph type="sldNum" sz="quarter" idx="10"/>
+          </p:nvPr>
+        </p:nvSpPr>
+        <p:spPr/>
+        <p:txBody>
+          <a:bodyPr/>
+          <a:lstStyle/>
+          <a:p>
+            <a:fld id="{18BDFEC3-8487-43E8-A154-7C12CBC1FFF2}" type="slidenum">
+              <a:rPr lang="en-US"/>
+              <a:t>3</a:t>
             </a:fld>
             <a:endParaRPr lang="en-US"/>
           </a:p>
@@ -4419,15 +4602,31 @@
             </a:pPr>
             <a:r>
               <a:rPr/>
-              <a:t>Break</a:t>
-            </a:r>
-            <a:r>
-              <a:rPr/>
-              <a:t> </a:t>
-            </a:r>
-            <a:r>
-              <a:rPr/>
-              <a:t>#1</a:t>
+              <a:t>Basic</a:t>
+            </a:r>
+            <a:r>
+              <a:rPr/>
+              <a:t> </a:t>
+            </a:r>
+            <a:r>
+              <a:rPr/>
+              <a:t>program,</a:t>
+            </a:r>
+            <a:r>
+              <a:rPr/>
+              <a:t> </a:t>
+            </a:r>
+            <a:r>
+              <a:rPr/>
+              <a:t>part</a:t>
+            </a:r>
+            <a:r>
+              <a:rPr/>
+              <a:t> </a:t>
+            </a:r>
+            <a:r>
+              <a:rPr/>
+              <a:t>3</a:t>
             </a:r>
           </a:p>
         </p:txBody>
@@ -4447,17 +4646,17 @@
           <a:bodyPr/>
           <a:lstStyle/>
           <a:p>
-            <a:pPr lvl="1"/>
-            <a:r>
-              <a:rPr/>
-              <a:t>What have you learned.</a:t>
-            </a:r>
-          </a:p>
-          <a:p>
-            <a:pPr lvl="1"/>
-            <a:r>
-              <a:rPr/>
-              <a:t>What’s coming next</a:t>
+            <a:pPr lvl="0" marL="1270000" indent="0">
+              <a:buNone/>
+            </a:pPr>
+            <a:r>
+              <a:rPr sz="1800">
+                <a:latin typeface="Courier"/>
+              </a:rPr>
+              <a:t>proc print
+    data=small_example(obs=1);
+title "First row of data";
+run;</a:t>
             </a:r>
           </a:p>
         </p:txBody>
@@ -4468,6 +4667,91 @@
 </file>
 
 <file path=ppt/slides/slide5.xml><?xml version="1.0" encoding="utf-8"?>
+<p:sld xmlns:a="http://schemas.openxmlformats.org/drawingml/2006/main" xmlns:r="http://schemas.openxmlformats.org/officeDocument/2006/relationships" xmlns:p="http://schemas.openxmlformats.org/presentationml/2006/main">
+  <p:cSld>
+    <p:spTree>
+      <p:nvGrpSpPr>
+        <p:cNvPr id="1" name=""/>
+        <p:cNvGrpSpPr/>
+        <p:nvPr/>
+      </p:nvGrpSpPr>
+      <p:grpSpPr>
+        <a:xfrm>
+          <a:off x="0" y="0"/>
+          <a:ext cx="0" cy="0"/>
+          <a:chOff x="0" y="0"/>
+          <a:chExt cx="0" cy="0"/>
+        </a:xfrm>
+      </p:grpSpPr>
+      <p:sp>
+        <p:nvSpPr>
+          <p:cNvPr id="2" name="Title 1"/>
+          <p:cNvSpPr>
+            <a:spLocks noGrp="1"/>
+          </p:cNvSpPr>
+          <p:nvPr>
+            <p:ph type="title"/>
+          </p:nvPr>
+        </p:nvSpPr>
+        <p:spPr/>
+        <p:txBody>
+          <a:bodyPr/>
+          <a:lstStyle/>
+          <a:p>
+            <a:pPr lvl="0" marL="0" indent="0">
+              <a:buNone/>
+            </a:pPr>
+            <a:r>
+              <a:rPr/>
+              <a:t>Break</a:t>
+            </a:r>
+            <a:r>
+              <a:rPr/>
+              <a:t> </a:t>
+            </a:r>
+            <a:r>
+              <a:rPr/>
+              <a:t>#1</a:t>
+            </a:r>
+          </a:p>
+        </p:txBody>
+      </p:sp>
+      <p:sp>
+        <p:nvSpPr>
+          <p:cNvPr id="3" name="Content Placeholder 2"/>
+          <p:cNvSpPr>
+            <a:spLocks noGrp="1"/>
+          </p:cNvSpPr>
+          <p:nvPr>
+            <p:ph idx="1"/>
+          </p:nvPr>
+        </p:nvSpPr>
+        <p:spPr/>
+        <p:txBody>
+          <a:bodyPr/>
+          <a:lstStyle/>
+          <a:p>
+            <a:pPr lvl="1"/>
+            <a:r>
+              <a:rPr/>
+              <a:t>What have you learned.</a:t>
+            </a:r>
+          </a:p>
+          <a:p>
+            <a:pPr lvl="1"/>
+            <a:r>
+              <a:rPr/>
+              <a:t>What’s coming next</a:t>
+            </a:r>
+          </a:p>
+        </p:txBody>
+      </p:sp>
+    </p:spTree>
+  </p:cSld>
+</p:sld>
+</file>
+
+<file path=ppt/slides/slide6.xml><?xml version="1.0" encoding="utf-8"?>
 <p:sld xmlns:a="http://schemas.openxmlformats.org/drawingml/2006/main" xmlns:r="http://schemas.openxmlformats.org/officeDocument/2006/relationships" xmlns:p="http://schemas.openxmlformats.org/presentationml/2006/main">
   <p:cSld>
     <p:spTree>

</xml_diff>